<commit_message>
change items order in 'What we need' slide
</commit_message>
<xml_diff>
--- a/Presentation.pptx
+++ b/Presentation.pptx
@@ -4371,20 +4371,76 @@
               </a:lnSpc>
             </a:pPr>
             <a:r>
-              <a:rPr lang="en-US" sz="3200" b="1" dirty="0" smtClean="0">
+              <a:rPr lang="en-US" sz="3200" b="1" dirty="0">
                 <a:solidFill>
                   <a:srgbClr val="CC3333"/>
                 </a:solidFill>
               </a:rPr>
-              <a:t>PFILE</a:t>
-            </a:r>
-            <a:r>
-              <a:rPr lang="en-US" sz="3200" dirty="0" smtClean="0">
+              <a:t>Primary </a:t>
+            </a:r>
+            <a:r>
+              <a:rPr lang="en-US" sz="3200" dirty="0">
                 <a:solidFill>
                   <a:srgbClr val="CC3333"/>
                 </a:solidFill>
               </a:rPr>
-              <a:t>s (for all databases)</a:t>
+              <a:t>or</a:t>
+            </a:r>
+            <a:r>
+              <a:rPr lang="en-US" sz="3200" b="1" dirty="0">
+                <a:solidFill>
+                  <a:srgbClr val="CC3333"/>
+                </a:solidFill>
+              </a:rPr>
+              <a:t> Physical Standby </a:t>
+            </a:r>
+            <a:r>
+              <a:rPr lang="en-US" sz="3200" dirty="0">
+                <a:solidFill>
+                  <a:srgbClr val="CC3333"/>
+                </a:solidFill>
+              </a:rPr>
+              <a:t>database</a:t>
+            </a:r>
+            <a:r>
+              <a:rPr lang="en-US" sz="3200" b="1" dirty="0">
+                <a:solidFill>
+                  <a:srgbClr val="CC3333"/>
+                </a:solidFill>
+              </a:rPr>
+              <a:t> in backup </a:t>
+            </a:r>
+          </a:p>
+          <a:p>
+            <a:pPr marL="0" indent="0">
+              <a:lnSpc>
+                <a:spcPct val="150000"/>
+              </a:lnSpc>
+              <a:buNone/>
+            </a:pPr>
+            <a:r>
+              <a:rPr lang="en-US" sz="3200" b="1" dirty="0">
+                <a:solidFill>
+                  <a:srgbClr val="CC3333"/>
+                </a:solidFill>
+              </a:rPr>
+              <a:t>  (+ Logical </a:t>
+            </a:r>
+            <a:r>
+              <a:rPr lang="en-US" sz="3200" dirty="0">
+                <a:solidFill>
+                  <a:srgbClr val="CC3333"/>
+                </a:solidFill>
+              </a:rPr>
+              <a:t>database</a:t>
+            </a:r>
+            <a:r>
+              <a:rPr lang="en-US" sz="3200" b="1" dirty="0">
+                <a:solidFill>
+                  <a:srgbClr val="CC3333"/>
+                </a:solidFill>
+              </a:rPr>
+              <a:t>)</a:t>
             </a:r>
           </a:p>
           <a:p>
@@ -4394,12 +4450,52 @@
               </a:lnSpc>
             </a:pPr>
             <a:r>
-              <a:rPr lang="en-US" sz="3200" dirty="0" smtClean="0">
+              <a:rPr lang="en-US" sz="3200" dirty="0">
                 <a:solidFill>
                   <a:srgbClr val="CC3333"/>
                 </a:solidFill>
               </a:rPr>
-              <a:t>Network files:</a:t>
+              <a:t>Database</a:t>
+            </a:r>
+            <a:r>
+              <a:rPr lang="en-US" sz="3200" b="1" dirty="0">
+                <a:solidFill>
+                  <a:srgbClr val="CC3333"/>
+                </a:solidFill>
+              </a:rPr>
+              <a:t> Role </a:t>
+            </a:r>
+            <a:r>
+              <a:rPr lang="en-US" sz="3200" dirty="0">
+                <a:solidFill>
+                  <a:srgbClr val="CC3333"/>
+                </a:solidFill>
+              </a:rPr>
+              <a:t>-&gt;</a:t>
+            </a:r>
+            <a:r>
+              <a:rPr lang="en-US" sz="3200" b="1" dirty="0">
+                <a:solidFill>
+                  <a:srgbClr val="CC3333"/>
+                </a:solidFill>
+              </a:rPr>
+              <a:t> Host IP </a:t>
+            </a:r>
+            <a:r>
+              <a:rPr lang="en-US" sz="3200" dirty="0">
+                <a:solidFill>
+                  <a:srgbClr val="CC3333"/>
+                </a:solidFill>
+              </a:rPr>
+              <a:t>or</a:t>
+            </a:r>
+            <a:r>
+              <a:rPr lang="en-US" sz="3200" b="1" dirty="0">
+                <a:solidFill>
+                  <a:srgbClr val="CC3333"/>
+                </a:solidFill>
+              </a:rPr>
+              <a:t> DNS </a:t>
             </a:r>
             <a:r>
               <a:rPr lang="en-US" sz="3200" b="1" dirty="0" smtClean="0">
@@ -4407,48 +4503,13 @@
                   <a:srgbClr val="CC3333"/>
                 </a:solidFill>
               </a:rPr>
-              <a:t> </a:t>
-            </a:r>
-            <a:r>
-              <a:rPr lang="en-US" sz="3200" b="1" dirty="0" err="1" smtClean="0">
-                <a:solidFill>
-                  <a:srgbClr val="CC3333"/>
-                </a:solidFill>
-              </a:rPr>
-              <a:t>tnsnames.ora</a:t>
-            </a:r>
-            <a:r>
-              <a:rPr lang="en-US" sz="3200" b="1" dirty="0" smtClean="0">
-                <a:solidFill>
-                  <a:srgbClr val="CC3333"/>
-                </a:solidFill>
-              </a:rPr>
-              <a:t>, </a:t>
-            </a:r>
-            <a:r>
-              <a:rPr lang="en-US" sz="3200" b="1" dirty="0" err="1" smtClean="0">
-                <a:solidFill>
-                  <a:srgbClr val="CC3333"/>
-                </a:solidFill>
-              </a:rPr>
-              <a:t>listener.ora</a:t>
-            </a:r>
-            <a:r>
-              <a:rPr lang="en-US" sz="3200" b="1" dirty="0" smtClean="0">
-                <a:solidFill>
-                  <a:srgbClr val="CC3333"/>
-                </a:solidFill>
-              </a:rPr>
-              <a:t> </a:t>
-            </a:r>
-            <a:r>
-              <a:rPr lang="en-US" sz="3200" dirty="0" smtClean="0">
-                <a:solidFill>
-                  <a:srgbClr val="CC3333"/>
-                </a:solidFill>
-              </a:rPr>
-              <a:t>(for all hosts)</a:t>
-            </a:r>
+              <a:t>name</a:t>
+            </a:r>
+            <a:endParaRPr lang="en-US" sz="3200" b="1" dirty="0" smtClean="0">
+              <a:solidFill>
+                <a:srgbClr val="CC3333"/>
+              </a:solidFill>
+            </a:endParaRPr>
           </a:p>
           <a:p>
             <a:pPr>
@@ -4457,52 +4518,28 @@
               </a:lnSpc>
             </a:pPr>
             <a:r>
+              <a:rPr lang="en-US" sz="3200" b="1" dirty="0" smtClean="0">
+                <a:solidFill>
+                  <a:srgbClr val="CC3333"/>
+                </a:solidFill>
+              </a:rPr>
+              <a:t>PFILE</a:t>
+            </a:r>
+            <a:r>
               <a:rPr lang="en-US" sz="3200" dirty="0" smtClean="0">
                 <a:solidFill>
                   <a:srgbClr val="CC3333"/>
                 </a:solidFill>
               </a:rPr>
-              <a:t>Database</a:t>
-            </a:r>
-            <a:r>
-              <a:rPr lang="en-US" sz="3200" b="1" dirty="0" smtClean="0">
+              <a:t>s </a:t>
+            </a:r>
+            <a:r>
+              <a:rPr lang="en-US" sz="3200" dirty="0" smtClean="0">
                 <a:solidFill>
                   <a:srgbClr val="CC3333"/>
                 </a:solidFill>
               </a:rPr>
-              <a:t> Role </a:t>
-            </a:r>
-            <a:r>
-              <a:rPr lang="en-US" sz="3200" dirty="0" smtClean="0">
-                <a:solidFill>
-                  <a:srgbClr val="CC3333"/>
-                </a:solidFill>
-              </a:rPr>
-              <a:t>-&gt;</a:t>
-            </a:r>
-            <a:r>
-              <a:rPr lang="en-US" sz="3200" b="1" dirty="0" smtClean="0">
-                <a:solidFill>
-                  <a:srgbClr val="CC3333"/>
-                </a:solidFill>
-              </a:rPr>
-              <a:t> Host IP </a:t>
-            </a:r>
-            <a:r>
-              <a:rPr lang="en-US" sz="3200" dirty="0" smtClean="0">
-                <a:solidFill>
-                  <a:srgbClr val="CC3333"/>
-                </a:solidFill>
-              </a:rPr>
-              <a:t>or</a:t>
-            </a:r>
-            <a:r>
-              <a:rPr lang="en-US" sz="3200" b="1" dirty="0" smtClean="0">
-                <a:solidFill>
-                  <a:srgbClr val="CC3333"/>
-                </a:solidFill>
-              </a:rPr>
-              <a:t> DNS name</a:t>
+              <a:t>(for all databases)</a:t>
             </a:r>
           </a:p>
           <a:p>
@@ -4512,12 +4549,52 @@
               </a:lnSpc>
             </a:pPr>
             <a:r>
+              <a:rPr lang="en-US" sz="3200" dirty="0" smtClean="0">
+                <a:solidFill>
+                  <a:srgbClr val="CC3333"/>
+                </a:solidFill>
+              </a:rPr>
+              <a:t>Network files:</a:t>
+            </a:r>
+            <a:r>
               <a:rPr lang="en-US" sz="3200" b="1" dirty="0" smtClean="0">
                 <a:solidFill>
                   <a:srgbClr val="CC3333"/>
                 </a:solidFill>
               </a:rPr>
-              <a:t>Primary </a:t>
+              <a:t> </a:t>
+            </a:r>
+            <a:r>
+              <a:rPr lang="en-US" sz="3200" b="1" dirty="0" err="1" smtClean="0">
+                <a:solidFill>
+                  <a:srgbClr val="CC3333"/>
+                </a:solidFill>
+              </a:rPr>
+              <a:t>tnsnames.ora</a:t>
+            </a:r>
+            <a:r>
+              <a:rPr lang="en-US" sz="3200" b="1" dirty="0" smtClean="0">
+                <a:solidFill>
+                  <a:srgbClr val="CC3333"/>
+                </a:solidFill>
+              </a:rPr>
+              <a:t>, </a:t>
+            </a:r>
+            <a:r>
+              <a:rPr lang="en-US" sz="3200" b="1" dirty="0" err="1" smtClean="0">
+                <a:solidFill>
+                  <a:srgbClr val="CC3333"/>
+                </a:solidFill>
+              </a:rPr>
+              <a:t>listener.ora</a:t>
+            </a:r>
+            <a:r>
+              <a:rPr lang="en-US" sz="3200" b="1" dirty="0" smtClean="0">
+                <a:solidFill>
+                  <a:srgbClr val="CC3333"/>
+                </a:solidFill>
+              </a:rPr>
+              <a:t> </a:t>
             </a:r>
             <a:r>
               <a:rPr lang="en-US" sz="3200" dirty="0" smtClean="0">
@@ -4525,72 +4602,21 @@
                   <a:srgbClr val="CC3333"/>
                 </a:solidFill>
               </a:rPr>
-              <a:t>or</a:t>
-            </a:r>
-            <a:r>
-              <a:rPr lang="en-US" sz="3200" b="1" dirty="0" smtClean="0">
+              <a:t>(for all hosts</a:t>
+            </a:r>
+            <a:r>
+              <a:rPr lang="en-US" sz="3200" dirty="0" smtClean="0">
                 <a:solidFill>
                   <a:srgbClr val="CC3333"/>
                 </a:solidFill>
               </a:rPr>
-              <a:t> Physical Standby </a:t>
-            </a:r>
-            <a:r>
-              <a:rPr lang="en-US" sz="3200" dirty="0" smtClean="0">
-                <a:solidFill>
-                  <a:srgbClr val="CC3333"/>
-                </a:solidFill>
-              </a:rPr>
-              <a:t>database</a:t>
-            </a:r>
-            <a:r>
-              <a:rPr lang="en-US" sz="3200" b="1" dirty="0" smtClean="0">
-                <a:solidFill>
-                  <a:srgbClr val="CC3333"/>
-                </a:solidFill>
-              </a:rPr>
-              <a:t> in backup </a:t>
-            </a:r>
-          </a:p>
-          <a:p>
-            <a:pPr marL="0" indent="0">
-              <a:lnSpc>
-                <a:spcPct val="150000"/>
-              </a:lnSpc>
-              <a:buNone/>
-            </a:pPr>
-            <a:r>
-              <a:rPr lang="en-US" sz="3200" b="1" dirty="0">
-                <a:solidFill>
-                  <a:srgbClr val="CC3333"/>
-                </a:solidFill>
-              </a:rPr>
-              <a:t> </a:t>
-            </a:r>
-            <a:r>
-              <a:rPr lang="en-US" sz="3200" b="1" dirty="0" smtClean="0">
-                <a:solidFill>
-                  <a:srgbClr val="CC3333"/>
-                </a:solidFill>
-              </a:rPr>
-              <a:t> (+ Logical </a:t>
-            </a:r>
-            <a:r>
-              <a:rPr lang="en-US" sz="3200" dirty="0" smtClean="0">
-                <a:solidFill>
-                  <a:srgbClr val="CC3333"/>
-                </a:solidFill>
-              </a:rPr>
-              <a:t>database</a:t>
-            </a:r>
-            <a:r>
-              <a:rPr lang="en-US" sz="3200" b="1" dirty="0" smtClean="0">
-                <a:solidFill>
-                  <a:srgbClr val="CC3333"/>
-                </a:solidFill>
-              </a:rPr>
               <a:t>)</a:t>
             </a:r>
+            <a:endParaRPr lang="en-US" sz="3200" dirty="0" smtClean="0">
+              <a:solidFill>
+                <a:srgbClr val="CC3333"/>
+              </a:solidFill>
+            </a:endParaRPr>
           </a:p>
         </p:txBody>
       </p:sp>
@@ -4724,10 +4750,10 @@
               <a:t>13</a:t>
             </a:fld>
             <a:r>
-              <a:rPr lang="en-US"/>
+              <a:rPr lang="en-US" dirty="0"/>
               <a:t>/13</a:t>
             </a:r>
-            <a:endParaRPr lang="en-US"/>
+            <a:endParaRPr lang="en-US" dirty="0"/>
           </a:p>
         </p:txBody>
       </p:sp>

</xml_diff>